<commit_message>
[add] info specific to the alpha emitters
</commit_message>
<xml_diff>
--- a/fr_decay/fr_decay.pptx
+++ b/fr_decay/fr_decay.pptx
@@ -13826,6 +13826,49 @@
           </a:p>
         </p:txBody>
       </p:sp>
+      <p:cxnSp>
+        <p:nvCxnSpPr>
+          <p:cNvPr id="90" name="直線矢印コネクタ 5">
+            <a:extLst>
+              <a:ext uri="{FF2B5EF4-FFF2-40B4-BE49-F238E27FC236}">
+                <a16:creationId xmlns:a16="http://schemas.microsoft.com/office/drawing/2014/main" id="{EE498E42-E5FD-4157-BE2F-447248B6B99D}"/>
+              </a:ext>
+            </a:extLst>
+          </p:cNvPr>
+          <p:cNvCxnSpPr>
+            <a:cxnSpLocks/>
+            <a:stCxn id="36" idx="2"/>
+            <a:endCxn id="101" idx="0"/>
+          </p:cNvCxnSpPr>
+          <p:nvPr/>
+        </p:nvCxnSpPr>
+        <p:spPr>
+          <a:xfrm>
+            <a:off x="5527729" y="3276129"/>
+            <a:ext cx="1037282" cy="559219"/>
+          </a:xfrm>
+          <a:prstGeom prst="straightConnector1">
+            <a:avLst/>
+          </a:prstGeom>
+          <a:ln w="76200">
+            <a:tailEnd type="triangle"/>
+          </a:ln>
+        </p:spPr>
+        <p:style>
+          <a:lnRef idx="1">
+            <a:schemeClr val="accent1"/>
+          </a:lnRef>
+          <a:fillRef idx="0">
+            <a:schemeClr val="accent1"/>
+          </a:fillRef>
+          <a:effectRef idx="0">
+            <a:schemeClr val="accent1"/>
+          </a:effectRef>
+          <a:fontRef idx="minor">
+            <a:schemeClr val="tx1"/>
+          </a:fontRef>
+        </p:style>
+      </p:cxnSp>
     </p:spTree>
     <p:extLst>
       <p:ext uri="{BB962C8B-B14F-4D97-AF65-F5344CB8AC3E}">

</xml_diff>

<commit_message>
[add] complete version of the decay chains for each isotope
</commit_message>
<xml_diff>
--- a/fr_decay/fr_decay.pptx
+++ b/fr_decay/fr_decay.pptx
@@ -270,7 +270,7 @@
           <a:p>
             <a:fld id="{284171C4-9060-4136-AD00-37819C28F9FC}" type="datetimeFigureOut">
               <a:rPr kumimoji="1" lang="ja-JP" altLang="en-US" smtClean="0"/>
-              <a:t>2019/12/5</a:t>
+              <a:t>2019/12/9</a:t>
             </a:fld>
             <a:endParaRPr kumimoji="1" lang="ja-JP" altLang="en-US"/>
           </a:p>
@@ -500,7 +500,7 @@
           <a:p>
             <a:fld id="{284171C4-9060-4136-AD00-37819C28F9FC}" type="datetimeFigureOut">
               <a:rPr kumimoji="1" lang="ja-JP" altLang="en-US" smtClean="0"/>
-              <a:t>2019/12/5</a:t>
+              <a:t>2019/12/9</a:t>
             </a:fld>
             <a:endParaRPr kumimoji="1" lang="ja-JP" altLang="en-US"/>
           </a:p>
@@ -740,7 +740,7 @@
           <a:p>
             <a:fld id="{284171C4-9060-4136-AD00-37819C28F9FC}" type="datetimeFigureOut">
               <a:rPr kumimoji="1" lang="ja-JP" altLang="en-US" smtClean="0"/>
-              <a:t>2019/12/5</a:t>
+              <a:t>2019/12/9</a:t>
             </a:fld>
             <a:endParaRPr kumimoji="1" lang="ja-JP" altLang="en-US"/>
           </a:p>
@@ -970,7 +970,7 @@
           <a:p>
             <a:fld id="{284171C4-9060-4136-AD00-37819C28F9FC}" type="datetimeFigureOut">
               <a:rPr kumimoji="1" lang="ja-JP" altLang="en-US" smtClean="0"/>
-              <a:t>2019/12/5</a:t>
+              <a:t>2019/12/9</a:t>
             </a:fld>
             <a:endParaRPr kumimoji="1" lang="ja-JP" altLang="en-US"/>
           </a:p>
@@ -1245,7 +1245,7 @@
           <a:p>
             <a:fld id="{284171C4-9060-4136-AD00-37819C28F9FC}" type="datetimeFigureOut">
               <a:rPr kumimoji="1" lang="ja-JP" altLang="en-US" smtClean="0"/>
-              <a:t>2019/12/5</a:t>
+              <a:t>2019/12/9</a:t>
             </a:fld>
             <a:endParaRPr kumimoji="1" lang="ja-JP" altLang="en-US"/>
           </a:p>
@@ -1574,7 +1574,7 @@
           <a:p>
             <a:fld id="{284171C4-9060-4136-AD00-37819C28F9FC}" type="datetimeFigureOut">
               <a:rPr kumimoji="1" lang="ja-JP" altLang="en-US" smtClean="0"/>
-              <a:t>2019/12/5</a:t>
+              <a:t>2019/12/9</a:t>
             </a:fld>
             <a:endParaRPr kumimoji="1" lang="ja-JP" altLang="en-US"/>
           </a:p>
@@ -2050,7 +2050,7 @@
           <a:p>
             <a:fld id="{284171C4-9060-4136-AD00-37819C28F9FC}" type="datetimeFigureOut">
               <a:rPr kumimoji="1" lang="ja-JP" altLang="en-US" smtClean="0"/>
-              <a:t>2019/12/5</a:t>
+              <a:t>2019/12/9</a:t>
             </a:fld>
             <a:endParaRPr kumimoji="1" lang="ja-JP" altLang="en-US"/>
           </a:p>
@@ -2191,7 +2191,7 @@
           <a:p>
             <a:fld id="{284171C4-9060-4136-AD00-37819C28F9FC}" type="datetimeFigureOut">
               <a:rPr kumimoji="1" lang="ja-JP" altLang="en-US" smtClean="0"/>
-              <a:t>2019/12/5</a:t>
+              <a:t>2019/12/9</a:t>
             </a:fld>
             <a:endParaRPr kumimoji="1" lang="ja-JP" altLang="en-US"/>
           </a:p>
@@ -2304,7 +2304,7 @@
           <a:p>
             <a:fld id="{284171C4-9060-4136-AD00-37819C28F9FC}" type="datetimeFigureOut">
               <a:rPr kumimoji="1" lang="ja-JP" altLang="en-US" smtClean="0"/>
-              <a:t>2019/12/5</a:t>
+              <a:t>2019/12/9</a:t>
             </a:fld>
             <a:endParaRPr kumimoji="1" lang="ja-JP" altLang="en-US"/>
           </a:p>
@@ -2647,7 +2647,7 @@
           <a:p>
             <a:fld id="{284171C4-9060-4136-AD00-37819C28F9FC}" type="datetimeFigureOut">
               <a:rPr kumimoji="1" lang="ja-JP" altLang="en-US" smtClean="0"/>
-              <a:t>2019/12/5</a:t>
+              <a:t>2019/12/9</a:t>
             </a:fld>
             <a:endParaRPr kumimoji="1" lang="ja-JP" altLang="en-US"/>
           </a:p>
@@ -2935,7 +2935,7 @@
           <a:p>
             <a:fld id="{284171C4-9060-4136-AD00-37819C28F9FC}" type="datetimeFigureOut">
               <a:rPr kumimoji="1" lang="ja-JP" altLang="en-US" smtClean="0"/>
-              <a:t>2019/12/5</a:t>
+              <a:t>2019/12/9</a:t>
             </a:fld>
             <a:endParaRPr kumimoji="1" lang="ja-JP" altLang="en-US"/>
           </a:p>
@@ -3208,7 +3208,7 @@
           <a:p>
             <a:fld id="{284171C4-9060-4136-AD00-37819C28F9FC}" type="datetimeFigureOut">
               <a:rPr kumimoji="1" lang="ja-JP" altLang="en-US" smtClean="0"/>
-              <a:t>2019/12/5</a:t>
+              <a:t>2019/12/9</a:t>
             </a:fld>
             <a:endParaRPr kumimoji="1" lang="ja-JP" altLang="en-US"/>
           </a:p>
@@ -4953,8 +4953,8 @@
         </p:nvSpPr>
         <p:spPr>
           <a:xfrm>
-            <a:off x="243461" y="1758818"/>
-            <a:ext cx="2136182" cy="1015663"/>
+            <a:off x="99859" y="1529713"/>
+            <a:ext cx="2136182" cy="1077218"/>
           </a:xfrm>
           <a:prstGeom prst="rect">
             <a:avLst/>
@@ -4973,8 +4973,12 @@
           <a:lstStyle/>
           <a:p>
             <a:r>
-              <a:rPr lang="en-US" sz="1200" dirty="0"/>
-              <a:t>211Fr</a:t>
+              <a:rPr lang="en-US" sz="1600" baseline="30000" dirty="0"/>
+              <a:t>211</a:t>
+            </a:r>
+            <a:r>
+              <a:rPr lang="en-US" sz="1600" dirty="0"/>
+              <a:t>Fr</a:t>
             </a:r>
           </a:p>
           <a:p>
@@ -5017,8 +5021,8 @@
         </p:nvSpPr>
         <p:spPr>
           <a:xfrm>
-            <a:off x="243461" y="3156002"/>
-            <a:ext cx="2234638" cy="1569660"/>
+            <a:off x="99859" y="2691123"/>
+            <a:ext cx="2133360" cy="1631216"/>
           </a:xfrm>
           <a:prstGeom prst="rect">
             <a:avLst/>
@@ -5037,8 +5041,12 @@
           <a:lstStyle/>
           <a:p>
             <a:r>
-              <a:rPr lang="en-US" sz="1200" dirty="0"/>
-              <a:t>211Rn</a:t>
+              <a:rPr lang="en-US" sz="1600" baseline="30000" dirty="0"/>
+              <a:t>211</a:t>
+            </a:r>
+            <a:r>
+              <a:rPr lang="en-US" sz="1600" dirty="0"/>
+              <a:t>Rn</a:t>
             </a:r>
           </a:p>
           <a:p>
@@ -5197,8 +5205,8 @@
         </p:nvSpPr>
         <p:spPr>
           <a:xfrm>
-            <a:off x="264750" y="4926702"/>
-            <a:ext cx="2478099" cy="1200329"/>
+            <a:off x="2359028" y="2844376"/>
+            <a:ext cx="2478099" cy="1261884"/>
           </a:xfrm>
           <a:prstGeom prst="rect">
             <a:avLst/>
@@ -5217,8 +5225,12 @@
           <a:lstStyle/>
           <a:p>
             <a:r>
-              <a:rPr lang="en-US" sz="1200" dirty="0"/>
-              <a:t>211At</a:t>
+              <a:rPr lang="en-US" sz="1600" baseline="30000" dirty="0"/>
+              <a:t>211</a:t>
+            </a:r>
+            <a:r>
+              <a:rPr lang="en-US" sz="1600" dirty="0"/>
+              <a:t>At</a:t>
             </a:r>
           </a:p>
           <a:p>
@@ -5328,8 +5340,8 @@
         </p:nvSpPr>
         <p:spPr>
           <a:xfrm>
-            <a:off x="2738792" y="3517639"/>
-            <a:ext cx="2353908" cy="1015663"/>
+            <a:off x="7013912" y="54506"/>
+            <a:ext cx="2353908" cy="1077218"/>
           </a:xfrm>
           <a:prstGeom prst="rect">
             <a:avLst/>
@@ -5348,8 +5360,12 @@
           <a:lstStyle/>
           <a:p>
             <a:r>
-              <a:rPr lang="en-US" sz="1200" dirty="0"/>
-              <a:t>211Po</a:t>
+              <a:rPr lang="en-US" sz="1600" baseline="30000" dirty="0"/>
+              <a:t>211</a:t>
+            </a:r>
+            <a:r>
+              <a:rPr lang="en-US" sz="1600" dirty="0"/>
+              <a:t>Po</a:t>
             </a:r>
           </a:p>
           <a:p>
@@ -5392,8 +5408,8 @@
         </p:nvSpPr>
         <p:spPr>
           <a:xfrm>
-            <a:off x="2933700" y="4768626"/>
-            <a:ext cx="1196465" cy="461665"/>
+            <a:off x="2359028" y="4260470"/>
+            <a:ext cx="1196465" cy="523220"/>
           </a:xfrm>
           <a:prstGeom prst="rect">
             <a:avLst/>
@@ -5412,8 +5428,12 @@
           <a:lstStyle/>
           <a:p>
             <a:r>
-              <a:rPr lang="en-US" sz="1200" dirty="0"/>
-              <a:t>207At</a:t>
+              <a:rPr lang="en-US" sz="1600" baseline="30000" dirty="0"/>
+              <a:t>207</a:t>
+            </a:r>
+            <a:r>
+              <a:rPr lang="en-US" sz="1600" dirty="0"/>
+              <a:t>At</a:t>
             </a:r>
           </a:p>
           <a:p>
@@ -5536,8 +5556,8 @@
         </p:nvSpPr>
         <p:spPr>
           <a:xfrm>
-            <a:off x="2946904" y="5338012"/>
-            <a:ext cx="1320296" cy="461665"/>
+            <a:off x="3686481" y="4266066"/>
+            <a:ext cx="1320296" cy="523220"/>
           </a:xfrm>
           <a:prstGeom prst="rect">
             <a:avLst/>
@@ -5556,8 +5576,12 @@
           <a:lstStyle/>
           <a:p>
             <a:r>
-              <a:rPr lang="en-US" sz="1200" dirty="0"/>
-              <a:t>207Po</a:t>
+              <a:rPr lang="en-US" sz="1600" baseline="30000" dirty="0"/>
+              <a:t>207</a:t>
+            </a:r>
+            <a:r>
+              <a:rPr lang="en-US" sz="1600" dirty="0"/>
+              <a:t>Po</a:t>
             </a:r>
           </a:p>
           <a:p>
@@ -7435,8 +7459,8 @@
         </p:nvSpPr>
         <p:spPr>
           <a:xfrm>
-            <a:off x="9669567" y="2290671"/>
-            <a:ext cx="2136182" cy="2492990"/>
+            <a:off x="9741833" y="2206113"/>
+            <a:ext cx="2136182" cy="2554545"/>
           </a:xfrm>
           <a:prstGeom prst="rect">
             <a:avLst/>
@@ -7455,8 +7479,12 @@
           <a:lstStyle/>
           <a:p>
             <a:r>
-              <a:rPr lang="en-US" sz="1200" dirty="0"/>
-              <a:t>212Fr</a:t>
+              <a:rPr lang="en-US" sz="1600" baseline="30000" dirty="0"/>
+              <a:t>212</a:t>
+            </a:r>
+            <a:r>
+              <a:rPr lang="en-US" sz="1600" dirty="0"/>
+              <a:t>Fr</a:t>
             </a:r>
           </a:p>
           <a:p>
@@ -7592,8 +7620,8 @@
         </p:nvSpPr>
         <p:spPr>
           <a:xfrm>
-            <a:off x="9015252" y="92655"/>
-            <a:ext cx="2136182" cy="646331"/>
+            <a:off x="9741833" y="479113"/>
+            <a:ext cx="2136182" cy="707886"/>
           </a:xfrm>
           <a:prstGeom prst="rect">
             <a:avLst/>
@@ -7612,8 +7640,12 @@
           <a:lstStyle/>
           <a:p>
             <a:r>
-              <a:rPr lang="en-US" sz="1200" dirty="0"/>
-              <a:t>212Rn</a:t>
+              <a:rPr lang="en-US" sz="1600" baseline="30000" dirty="0"/>
+              <a:t>212</a:t>
+            </a:r>
+            <a:r>
+              <a:rPr lang="en-US" sz="1600" dirty="0"/>
+              <a:t>Rn</a:t>
             </a:r>
           </a:p>
           <a:p>
@@ -7644,8 +7676,8 @@
         </p:nvSpPr>
         <p:spPr>
           <a:xfrm>
-            <a:off x="9015251" y="946975"/>
-            <a:ext cx="2350715" cy="646331"/>
+            <a:off x="9527300" y="1342613"/>
+            <a:ext cx="2350715" cy="707886"/>
           </a:xfrm>
           <a:prstGeom prst="rect">
             <a:avLst/>
@@ -7664,8 +7696,12 @@
           <a:lstStyle/>
           <a:p>
             <a:r>
-              <a:rPr lang="en-US" sz="1200" dirty="0"/>
-              <a:t>208Po</a:t>
+              <a:rPr lang="en-US" sz="1600" baseline="30000" dirty="0"/>
+              <a:t>208</a:t>
+            </a:r>
+            <a:r>
+              <a:rPr lang="en-US" sz="1600" dirty="0"/>
+              <a:t>Po</a:t>
             </a:r>
           </a:p>
           <a:p>
@@ -8065,8 +8101,8 @@
         </p:nvSpPr>
         <p:spPr>
           <a:xfrm>
-            <a:off x="5917409" y="82129"/>
-            <a:ext cx="2350715" cy="830997"/>
+            <a:off x="6809901" y="475881"/>
+            <a:ext cx="2350715" cy="892552"/>
           </a:xfrm>
           <a:prstGeom prst="rect">
             <a:avLst/>
@@ -8085,8 +8121,12 @@
           <a:lstStyle/>
           <a:p>
             <a:r>
-              <a:rPr lang="en-US" sz="1200" dirty="0"/>
-              <a:t>208At</a:t>
+              <a:rPr lang="en-US" sz="1600" baseline="30000" dirty="0"/>
+              <a:t>208</a:t>
+            </a:r>
+            <a:r>
+              <a:rPr lang="en-US" sz="1600" dirty="0"/>
+              <a:t>At</a:t>
             </a:r>
           </a:p>
           <a:p>
@@ -8123,8 +8163,8 @@
         </p:nvSpPr>
         <p:spPr>
           <a:xfrm>
-            <a:off x="170958" y="4161359"/>
-            <a:ext cx="2136182" cy="646331"/>
+            <a:off x="182419" y="3936024"/>
+            <a:ext cx="2136182" cy="707886"/>
           </a:xfrm>
           <a:prstGeom prst="rect">
             <a:avLst/>
@@ -8143,8 +8183,12 @@
           <a:lstStyle/>
           <a:p>
             <a:r>
-              <a:rPr lang="en-US" sz="1200" dirty="0"/>
-              <a:t>208Rn</a:t>
+              <a:rPr lang="en-US" sz="1600" baseline="30000" dirty="0"/>
+              <a:t>208</a:t>
+            </a:r>
+            <a:r>
+              <a:rPr lang="en-US" sz="1600" dirty="0"/>
+              <a:t>Rn</a:t>
             </a:r>
           </a:p>
           <a:p>
@@ -8220,8 +8264,8 @@
         </p:nvSpPr>
         <p:spPr>
           <a:xfrm>
-            <a:off x="170959" y="3494847"/>
-            <a:ext cx="1060942" cy="461665"/>
+            <a:off x="178108" y="3268442"/>
+            <a:ext cx="1060942" cy="523220"/>
           </a:xfrm>
           <a:prstGeom prst="rect">
             <a:avLst/>
@@ -8240,8 +8284,12 @@
           <a:lstStyle/>
           <a:p>
             <a:r>
-              <a:rPr lang="en-US" sz="1200" dirty="0"/>
-              <a:t>208Fr</a:t>
+              <a:rPr lang="en-US" sz="1600" baseline="30000" dirty="0"/>
+              <a:t>208</a:t>
+            </a:r>
+            <a:r>
+              <a:rPr lang="en-US" sz="1600" dirty="0"/>
+              <a:t>Fr</a:t>
             </a:r>
           </a:p>
           <a:p>
@@ -8319,8 +8367,8 @@
         </p:nvSpPr>
         <p:spPr>
           <a:xfrm>
-            <a:off x="143431" y="4909366"/>
-            <a:ext cx="1260711" cy="461665"/>
+            <a:off x="178108" y="4783661"/>
+            <a:ext cx="1260711" cy="523220"/>
           </a:xfrm>
           <a:prstGeom prst="rect">
             <a:avLst/>
@@ -8339,8 +8387,12 @@
           <a:lstStyle/>
           <a:p>
             <a:r>
-              <a:rPr lang="en-US" sz="1200" dirty="0"/>
-              <a:t>204At</a:t>
+              <a:rPr lang="en-US" sz="1600" baseline="30000" dirty="0"/>
+              <a:t>204</a:t>
+            </a:r>
+            <a:r>
+              <a:rPr lang="en-US" sz="1600" dirty="0"/>
+              <a:t>At</a:t>
             </a:r>
           </a:p>
           <a:p>
@@ -8463,8 +8515,8 @@
         </p:nvSpPr>
         <p:spPr>
           <a:xfrm>
-            <a:off x="233711" y="5673547"/>
-            <a:ext cx="1260711" cy="461665"/>
+            <a:off x="1629784" y="4783661"/>
+            <a:ext cx="1260711" cy="523220"/>
           </a:xfrm>
           <a:prstGeom prst="rect">
             <a:avLst/>
@@ -8483,8 +8535,12 @@
           <a:lstStyle/>
           <a:p>
             <a:r>
-              <a:rPr lang="en-US" sz="1200" dirty="0"/>
-              <a:t>204Po</a:t>
+              <a:rPr lang="en-US" sz="1600" baseline="30000" dirty="0"/>
+              <a:t>204</a:t>
+            </a:r>
+            <a:r>
+              <a:rPr lang="en-US" sz="1600" dirty="0"/>
+              <a:t>Po</a:t>
             </a:r>
           </a:p>
           <a:p>
@@ -29856,7 +29912,7 @@
         <p:spPr>
           <a:xfrm>
             <a:off x="209281" y="1249373"/>
-            <a:ext cx="1165138" cy="461665"/>
+            <a:ext cx="1089680" cy="523220"/>
           </a:xfrm>
           <a:prstGeom prst="rect">
             <a:avLst/>
@@ -29875,8 +29931,12 @@
           <a:lstStyle/>
           <a:p>
             <a:r>
-              <a:rPr lang="en-US" sz="1200" dirty="0"/>
-              <a:t>209Fr</a:t>
+              <a:rPr lang="en-US" sz="1600" baseline="30000" dirty="0"/>
+              <a:t>209</a:t>
+            </a:r>
+            <a:r>
+              <a:rPr lang="en-US" sz="1600" dirty="0"/>
+              <a:t>Fr</a:t>
             </a:r>
           </a:p>
           <a:p>
@@ -29955,7 +30015,7 @@
         <p:spPr>
           <a:xfrm>
             <a:off x="209281" y="1969203"/>
-            <a:ext cx="2102170" cy="1015663"/>
+            <a:ext cx="2102170" cy="1077218"/>
           </a:xfrm>
           <a:prstGeom prst="rect">
             <a:avLst/>
@@ -29974,8 +30034,12 @@
           <a:lstStyle/>
           <a:p>
             <a:r>
-              <a:rPr lang="en-US" sz="1200" dirty="0"/>
-              <a:t>209Rn</a:t>
+              <a:rPr lang="en-US" sz="1600" baseline="30000" dirty="0"/>
+              <a:t>209</a:t>
+            </a:r>
+            <a:r>
+              <a:rPr lang="en-US" sz="1600" dirty="0"/>
+              <a:t>Rn</a:t>
             </a:r>
           </a:p>
           <a:p>
@@ -30018,8 +30082,8 @@
         </p:nvSpPr>
         <p:spPr>
           <a:xfrm>
-            <a:off x="253463" y="3243031"/>
-            <a:ext cx="1165138" cy="461665"/>
+            <a:off x="211918" y="3243030"/>
+            <a:ext cx="1165138" cy="523220"/>
           </a:xfrm>
           <a:prstGeom prst="rect">
             <a:avLst/>
@@ -30038,8 +30102,12 @@
           <a:lstStyle/>
           <a:p>
             <a:r>
-              <a:rPr lang="en-US" sz="1200" dirty="0"/>
-              <a:t>209At</a:t>
+              <a:rPr lang="en-US" sz="1600" baseline="30000" dirty="0"/>
+              <a:t>209</a:t>
+            </a:r>
+            <a:r>
+              <a:rPr lang="en-US" sz="1600" dirty="0"/>
+              <a:t>At</a:t>
             </a:r>
           </a:p>
           <a:p>
@@ -30277,8 +30345,8 @@
         </p:nvSpPr>
         <p:spPr>
           <a:xfrm>
-            <a:off x="253462" y="3962861"/>
-            <a:ext cx="2335913" cy="1200329"/>
+            <a:off x="209281" y="3962859"/>
+            <a:ext cx="2335913" cy="1261884"/>
           </a:xfrm>
           <a:prstGeom prst="rect">
             <a:avLst/>
@@ -30297,8 +30365,12 @@
           <a:lstStyle/>
           <a:p>
             <a:r>
-              <a:rPr lang="en-US" sz="1200" dirty="0"/>
-              <a:t>209Po</a:t>
+              <a:rPr lang="en-US" sz="1600" baseline="30000" dirty="0"/>
+              <a:t>209</a:t>
+            </a:r>
+            <a:r>
+              <a:rPr lang="en-US" sz="1600" dirty="0"/>
+              <a:t>Po</a:t>
             </a:r>
           </a:p>
           <a:p>
@@ -30497,8 +30569,8 @@
         </p:nvSpPr>
         <p:spPr>
           <a:xfrm>
-            <a:off x="305857" y="5421355"/>
-            <a:ext cx="1776331" cy="646331"/>
+            <a:off x="209281" y="5421352"/>
+            <a:ext cx="1776331" cy="707886"/>
           </a:xfrm>
           <a:prstGeom prst="rect">
             <a:avLst/>
@@ -30517,8 +30589,12 @@
           <a:lstStyle/>
           <a:p>
             <a:r>
-              <a:rPr lang="en-US" sz="1200" dirty="0"/>
-              <a:t>209Bi</a:t>
+              <a:rPr lang="en-US" sz="1600" baseline="30000" dirty="0"/>
+              <a:t>209</a:t>
+            </a:r>
+            <a:r>
+              <a:rPr lang="en-US" sz="1600" dirty="0"/>
+              <a:t>Bi</a:t>
             </a:r>
           </a:p>
           <a:p>
@@ -30602,8 +30678,8 @@
         </p:nvSpPr>
         <p:spPr>
           <a:xfrm>
-            <a:off x="1827161" y="3243030"/>
-            <a:ext cx="1165138" cy="461665"/>
+            <a:off x="1606734" y="3243030"/>
+            <a:ext cx="1165138" cy="523220"/>
           </a:xfrm>
           <a:prstGeom prst="rect">
             <a:avLst/>
@@ -30622,8 +30698,12 @@
           <a:lstStyle/>
           <a:p>
             <a:r>
-              <a:rPr lang="en-US" sz="1200" dirty="0"/>
-              <a:t>205At</a:t>
+              <a:rPr lang="en-US" sz="1600" baseline="30000" dirty="0"/>
+              <a:t>205</a:t>
+            </a:r>
+            <a:r>
+              <a:rPr lang="en-US" sz="1600" dirty="0"/>
+              <a:t>At</a:t>
             </a:r>
           </a:p>
           <a:p>
@@ -30648,8 +30728,8 @@
         </p:nvSpPr>
         <p:spPr>
           <a:xfrm>
-            <a:off x="2771872" y="3999960"/>
-            <a:ext cx="1165138" cy="461665"/>
+            <a:off x="2788649" y="3956794"/>
+            <a:ext cx="1165138" cy="523220"/>
           </a:xfrm>
           <a:prstGeom prst="rect">
             <a:avLst/>
@@ -30668,8 +30748,12 @@
           <a:lstStyle/>
           <a:p>
             <a:r>
-              <a:rPr lang="en-US" sz="1200" dirty="0"/>
-              <a:t>205Po</a:t>
+              <a:rPr lang="en-US" sz="1600" baseline="30000" dirty="0"/>
+              <a:t>205</a:t>
+            </a:r>
+            <a:r>
+              <a:rPr lang="en-US" sz="1600" dirty="0"/>
+              <a:t>Po</a:t>
             </a:r>
           </a:p>
           <a:p>
@@ -30840,8 +30924,8 @@
         </p:nvSpPr>
         <p:spPr>
           <a:xfrm>
-            <a:off x="2771872" y="4701525"/>
-            <a:ext cx="1165138" cy="461665"/>
+            <a:off x="2788649" y="4701523"/>
+            <a:ext cx="1165138" cy="523220"/>
           </a:xfrm>
           <a:prstGeom prst="rect">
             <a:avLst/>
@@ -30860,8 +30944,12 @@
           <a:lstStyle/>
           <a:p>
             <a:r>
-              <a:rPr lang="en-US" sz="1200" dirty="0"/>
-              <a:t>201Bi</a:t>
+              <a:rPr lang="en-US" sz="1600" baseline="30000" dirty="0"/>
+              <a:t>201</a:t>
+            </a:r>
+            <a:r>
+              <a:rPr lang="en-US" sz="1600" dirty="0"/>
+              <a:t>Bi</a:t>
             </a:r>
           </a:p>
           <a:p>
@@ -32457,8 +32545,8 @@
         </p:nvSpPr>
         <p:spPr>
           <a:xfrm>
-            <a:off x="243461" y="1758818"/>
-            <a:ext cx="2136182" cy="1938992"/>
+            <a:off x="99854" y="1648415"/>
+            <a:ext cx="2136182" cy="2000548"/>
           </a:xfrm>
           <a:prstGeom prst="rect">
             <a:avLst/>
@@ -32477,9 +32565,14 @@
           <a:lstStyle/>
           <a:p>
             <a:r>
-              <a:rPr lang="en-US" sz="1200" dirty="0"/>
-              <a:t>210Fr</a:t>
-            </a:r>
+              <a:rPr lang="en-US" sz="1600" baseline="30000" dirty="0"/>
+              <a:t>210</a:t>
+            </a:r>
+            <a:r>
+              <a:rPr lang="en-US" sz="1600" dirty="0"/>
+              <a:t>Fr</a:t>
+            </a:r>
+            <a:endParaRPr lang="en-US" sz="1200" dirty="0"/>
           </a:p>
           <a:p>
             <a:r>
@@ -32649,8 +32742,8 @@
         </p:nvSpPr>
         <p:spPr>
           <a:xfrm>
-            <a:off x="287528" y="3789192"/>
-            <a:ext cx="2136182" cy="646331"/>
+            <a:off x="4013152" y="4404745"/>
+            <a:ext cx="2136182" cy="707886"/>
           </a:xfrm>
           <a:prstGeom prst="rect">
             <a:avLst/>
@@ -32669,8 +32762,12 @@
           <a:lstStyle/>
           <a:p>
             <a:r>
-              <a:rPr lang="en-US" sz="1200" dirty="0"/>
-              <a:t>210Rn</a:t>
+              <a:rPr lang="en-US" sz="1600" baseline="30000" dirty="0"/>
+              <a:t>210</a:t>
+            </a:r>
+            <a:r>
+              <a:rPr lang="en-US" sz="1600" dirty="0"/>
+              <a:t>Rn</a:t>
             </a:r>
           </a:p>
           <a:p>
@@ -32754,8 +32851,8 @@
         </p:nvSpPr>
         <p:spPr>
           <a:xfrm>
-            <a:off x="2572329" y="2820318"/>
-            <a:ext cx="2275093" cy="1938992"/>
+            <a:off x="101501" y="3841467"/>
+            <a:ext cx="2275094" cy="2000548"/>
           </a:xfrm>
           <a:prstGeom prst="rect">
             <a:avLst/>
@@ -32774,8 +32871,12 @@
           <a:lstStyle/>
           <a:p>
             <a:r>
-              <a:rPr lang="en-US" sz="1200" dirty="0"/>
-              <a:t>210At</a:t>
+              <a:rPr lang="en-US" sz="1600" baseline="30000" dirty="0"/>
+              <a:t>210</a:t>
+            </a:r>
+            <a:r>
+              <a:rPr lang="en-US" sz="1600" dirty="0"/>
+              <a:t>At</a:t>
             </a:r>
           </a:p>
           <a:p>
@@ -32903,8 +33004,8 @@
         </p:nvSpPr>
         <p:spPr>
           <a:xfrm>
-            <a:off x="270420" y="4577956"/>
-            <a:ext cx="2378632" cy="646331"/>
+            <a:off x="4011541" y="5268771"/>
+            <a:ext cx="2378632" cy="707886"/>
           </a:xfrm>
           <a:prstGeom prst="rect">
             <a:avLst/>
@@ -32923,8 +33024,12 @@
           <a:lstStyle/>
           <a:p>
             <a:r>
-              <a:rPr lang="en-US" sz="1200" dirty="0"/>
-              <a:t>210Po</a:t>
+              <a:rPr lang="en-US" sz="1600" baseline="30000" dirty="0"/>
+              <a:t>210</a:t>
+            </a:r>
+            <a:r>
+              <a:rPr lang="en-US" sz="1600" dirty="0"/>
+              <a:t>Po</a:t>
             </a:r>
           </a:p>
           <a:p>
@@ -33116,8 +33221,8 @@
         </p:nvSpPr>
         <p:spPr>
           <a:xfrm>
-            <a:off x="2852049" y="4866685"/>
-            <a:ext cx="2275093" cy="1015663"/>
+            <a:off x="2478091" y="3156005"/>
+            <a:ext cx="2275093" cy="1077218"/>
           </a:xfrm>
           <a:prstGeom prst="rect">
             <a:avLst/>
@@ -33136,8 +33241,12 @@
           <a:lstStyle/>
           <a:p>
             <a:r>
-              <a:rPr lang="en-US" sz="1200" dirty="0"/>
-              <a:t>206At</a:t>
+              <a:rPr lang="en-US" sz="1600" baseline="30000" dirty="0"/>
+              <a:t>206</a:t>
+            </a:r>
+            <a:r>
+              <a:rPr lang="en-US" sz="1600" dirty="0"/>
+              <a:t>At</a:t>
             </a:r>
           </a:p>
           <a:p>
@@ -33225,8 +33334,8 @@
         </p:nvSpPr>
         <p:spPr>
           <a:xfrm>
-            <a:off x="218073" y="5549627"/>
-            <a:ext cx="1433992" cy="461665"/>
+            <a:off x="2478091" y="5079981"/>
+            <a:ext cx="1433992" cy="523220"/>
           </a:xfrm>
           <a:prstGeom prst="rect">
             <a:avLst/>
@@ -33245,8 +33354,12 @@
           <a:lstStyle/>
           <a:p>
             <a:r>
-              <a:rPr lang="en-US" sz="1200" dirty="0"/>
-              <a:t>206Po</a:t>
+              <a:rPr lang="en-US" sz="1600" baseline="30000" dirty="0"/>
+              <a:t>206</a:t>
+            </a:r>
+            <a:r>
+              <a:rPr lang="en-US" sz="1600" dirty="0"/>
+              <a:t>Po</a:t>
             </a:r>
           </a:p>
           <a:p>
@@ -33465,8 +33578,8 @@
         </p:nvSpPr>
         <p:spPr>
           <a:xfrm>
-            <a:off x="287528" y="6090121"/>
-            <a:ext cx="1433992" cy="461665"/>
+            <a:off x="2478091" y="4394992"/>
+            <a:ext cx="1433992" cy="523220"/>
           </a:xfrm>
           <a:prstGeom prst="rect">
             <a:avLst/>
@@ -33485,8 +33598,12 @@
           <a:lstStyle/>
           <a:p>
             <a:r>
-              <a:rPr lang="en-US" sz="1200" dirty="0"/>
-              <a:t>202Pb</a:t>
+              <a:rPr lang="en-US" sz="1600" baseline="30000" dirty="0"/>
+              <a:t>202</a:t>
+            </a:r>
+            <a:r>
+              <a:rPr lang="en-US" sz="1600" dirty="0"/>
+              <a:t>Pb</a:t>
             </a:r>
           </a:p>
           <a:p>

</xml_diff>